<commit_message>
db string changes and documentation changes
</commit_message>
<xml_diff>
--- a/diplomski.pptx
+++ b/diplomski.pptx
@@ -224,7 +224,7 @@
           <a:p>
             <a:fld id="{0845F3B8-7F6B-47C6-BFA6-70BEF7F883F6}" type="datetimeFigureOut">
               <a:rPr lang="en-US" smtClean="0"/>
-              <a:t>2016-09-22</a:t>
+              <a:t>2016-09-26</a:t>
             </a:fld>
             <a:endParaRPr lang="en-US"/>
           </a:p>
@@ -496,7 +496,7 @@
           <a:p>
             <a:fld id="{1E1F6392-75C5-46A9-B6A4-B0F2BC5DE324}" type="datetimeFigureOut">
               <a:rPr lang="en-US" smtClean="0"/>
-              <a:t>2016-09-22</a:t>
+              <a:t>2016-09-26</a:t>
             </a:fld>
             <a:endParaRPr lang="en-US"/>
           </a:p>
@@ -932,7 +932,7 @@
           <a:p>
             <a:fld id="{1E1F6392-75C5-46A9-B6A4-B0F2BC5DE324}" type="datetimeFigureOut">
               <a:rPr lang="en-US" smtClean="0"/>
-              <a:t>2016-09-22</a:t>
+              <a:t>2016-09-26</a:t>
             </a:fld>
             <a:endParaRPr lang="en-US"/>
           </a:p>
@@ -1180,7 +1180,7 @@
           <a:p>
             <a:fld id="{1E1F6392-75C5-46A9-B6A4-B0F2BC5DE324}" type="datetimeFigureOut">
               <a:rPr lang="en-US" smtClean="0"/>
-              <a:t>2016-09-22</a:t>
+              <a:t>2016-09-26</a:t>
             </a:fld>
             <a:endParaRPr lang="en-US"/>
           </a:p>
@@ -1486,7 +1486,7 @@
           <a:p>
             <a:fld id="{1E1F6392-75C5-46A9-B6A4-B0F2BC5DE324}" type="datetimeFigureOut">
               <a:rPr lang="en-US" smtClean="0"/>
-              <a:t>2016-09-22</a:t>
+              <a:t>2016-09-26</a:t>
             </a:fld>
             <a:endParaRPr lang="en-US"/>
           </a:p>
@@ -1802,7 +1802,7 @@
           <a:p>
             <a:fld id="{1E1F6392-75C5-46A9-B6A4-B0F2BC5DE324}" type="datetimeFigureOut">
               <a:rPr lang="en-US" smtClean="0"/>
-              <a:t>2016-09-22</a:t>
+              <a:t>2016-09-26</a:t>
             </a:fld>
             <a:endParaRPr lang="en-US"/>
           </a:p>
@@ -2102,7 +2102,7 @@
           <a:p>
             <a:fld id="{1E1F6392-75C5-46A9-B6A4-B0F2BC5DE324}" type="datetimeFigureOut">
               <a:rPr lang="en-US" smtClean="0"/>
-              <a:t>2016-09-22</a:t>
+              <a:t>2016-09-26</a:t>
             </a:fld>
             <a:endParaRPr lang="en-US"/>
           </a:p>
@@ -2467,7 +2467,7 @@
           <a:p>
             <a:fld id="{1E1F6392-75C5-46A9-B6A4-B0F2BC5DE324}" type="datetimeFigureOut">
               <a:rPr lang="en-US" smtClean="0"/>
-              <a:t>2016-09-22</a:t>
+              <a:t>2016-09-26</a:t>
             </a:fld>
             <a:endParaRPr lang="en-US"/>
           </a:p>
@@ -2641,7 +2641,7 @@
           <a:p>
             <a:fld id="{1E1F6392-75C5-46A9-B6A4-B0F2BC5DE324}" type="datetimeFigureOut">
               <a:rPr lang="en-US" smtClean="0"/>
-              <a:t>2016-09-22</a:t>
+              <a:t>2016-09-26</a:t>
             </a:fld>
             <a:endParaRPr lang="en-US"/>
           </a:p>
@@ -2821,7 +2821,7 @@
           <a:p>
             <a:fld id="{1E1F6392-75C5-46A9-B6A4-B0F2BC5DE324}" type="datetimeFigureOut">
               <a:rPr lang="en-US" smtClean="0"/>
-              <a:t>2016-09-22</a:t>
+              <a:t>2016-09-26</a:t>
             </a:fld>
             <a:endParaRPr lang="en-US"/>
           </a:p>
@@ -2991,7 +2991,7 @@
           <a:p>
             <a:fld id="{1E1F6392-75C5-46A9-B6A4-B0F2BC5DE324}" type="datetimeFigureOut">
               <a:rPr lang="en-US" smtClean="0"/>
-              <a:t>2016-09-22</a:t>
+              <a:t>2016-09-26</a:t>
             </a:fld>
             <a:endParaRPr lang="en-US"/>
           </a:p>
@@ -3239,7 +3239,7 @@
           <a:p>
             <a:fld id="{1E1F6392-75C5-46A9-B6A4-B0F2BC5DE324}" type="datetimeFigureOut">
               <a:rPr lang="en-US" smtClean="0"/>
-              <a:t>2016-09-22</a:t>
+              <a:t>2016-09-26</a:t>
             </a:fld>
             <a:endParaRPr lang="en-US"/>
           </a:p>
@@ -3475,7 +3475,7 @@
           <a:p>
             <a:fld id="{1E1F6392-75C5-46A9-B6A4-B0F2BC5DE324}" type="datetimeFigureOut">
               <a:rPr lang="en-US" smtClean="0"/>
-              <a:t>2016-09-22</a:t>
+              <a:t>2016-09-26</a:t>
             </a:fld>
             <a:endParaRPr lang="en-US"/>
           </a:p>
@@ -3857,7 +3857,7 @@
           <a:p>
             <a:fld id="{1E1F6392-75C5-46A9-B6A4-B0F2BC5DE324}" type="datetimeFigureOut">
               <a:rPr lang="en-US" smtClean="0"/>
-              <a:t>2016-09-22</a:t>
+              <a:t>2016-09-26</a:t>
             </a:fld>
             <a:endParaRPr lang="en-US"/>
           </a:p>
@@ -3975,7 +3975,7 @@
           <a:p>
             <a:fld id="{1E1F6392-75C5-46A9-B6A4-B0F2BC5DE324}" type="datetimeFigureOut">
               <a:rPr lang="en-US" smtClean="0"/>
-              <a:t>2016-09-22</a:t>
+              <a:t>2016-09-26</a:t>
             </a:fld>
             <a:endParaRPr lang="en-US"/>
           </a:p>
@@ -4070,7 +4070,7 @@
           <a:p>
             <a:fld id="{1E1F6392-75C5-46A9-B6A4-B0F2BC5DE324}" type="datetimeFigureOut">
               <a:rPr lang="en-US" smtClean="0"/>
-              <a:t>2016-09-22</a:t>
+              <a:t>2016-09-26</a:t>
             </a:fld>
             <a:endParaRPr lang="en-US"/>
           </a:p>
@@ -4325,7 +4325,7 @@
           <a:p>
             <a:fld id="{1E1F6392-75C5-46A9-B6A4-B0F2BC5DE324}" type="datetimeFigureOut">
               <a:rPr lang="en-US" smtClean="0"/>
-              <a:t>2016-09-22</a:t>
+              <a:t>2016-09-26</a:t>
             </a:fld>
             <a:endParaRPr lang="en-US"/>
           </a:p>
@@ -4608,7 +4608,7 @@
           <a:p>
             <a:fld id="{1E1F6392-75C5-46A9-B6A4-B0F2BC5DE324}" type="datetimeFigureOut">
               <a:rPr lang="en-US" smtClean="0"/>
-              <a:t>2016-09-22</a:t>
+              <a:t>2016-09-26</a:t>
             </a:fld>
             <a:endParaRPr lang="en-US"/>
           </a:p>
@@ -5013,7 +5013,7 @@
           <a:p>
             <a:fld id="{1E1F6392-75C5-46A9-B6A4-B0F2BC5DE324}" type="datetimeFigureOut">
               <a:rPr lang="en-US" smtClean="0"/>
-              <a:t>2016-09-22</a:t>
+              <a:t>2016-09-26</a:t>
             </a:fld>
             <a:endParaRPr lang="en-US"/>
           </a:p>

</xml_diff>